<commit_message>
Added Course Materials - Day 14
</commit_message>
<xml_diff>
--- a/3. Spring/Day 12/Slides/4. Accessing Data with Spring Boot and H2/accessing-data-with-spring-boot-and-h2-slides.pptx
+++ b/3. Spring/Day 12/Slides/4. Accessing Data with Spring Boot and H2/accessing-data-with-spring-boot-and-h2-slides.pptx
@@ -3504,8 +3504,8 @@
         </p:nvSpPr>
         <p:spPr>
           <a:xfrm>
-            <a:off x="4266900" y="325627"/>
-            <a:ext cx="3571240" cy="574040"/>
+            <a:off x="1066745" y="152273"/>
+            <a:ext cx="10619849" cy="574039"/>
           </a:xfrm>
           <a:prstGeom prst="rect">
             <a:avLst/>
@@ -3557,115 +3557,6 @@
           </a:p>
         </p:txBody>
       </p:sp>
-      <p:grpSp>
-        <p:nvGrpSpPr>
-          <p:cNvPr id="3" name="object 3"/>
-          <p:cNvGrpSpPr/>
-          <p:nvPr/>
-        </p:nvGrpSpPr>
-        <p:grpSpPr>
-          <a:xfrm>
-            <a:off x="1493519" y="941831"/>
-            <a:ext cx="5824855" cy="5882640"/>
-            <a:chOff x="1493519" y="941831"/>
-            <a:chExt cx="5824855" cy="5882640"/>
-          </a:xfrm>
-        </p:grpSpPr>
-        <p:pic>
-          <p:nvPicPr>
-            <p:cNvPr id="4" name="object 4"/>
-            <p:cNvPicPr/>
-            <p:nvPr/>
-          </p:nvPicPr>
-          <p:blipFill>
-            <a:blip r:embed="rId1" cstate="print"/>
-            <a:stretch>
-              <a:fillRect/>
-            </a:stretch>
-          </p:blipFill>
-          <p:spPr>
-            <a:xfrm>
-              <a:off x="1493519" y="941831"/>
-              <a:ext cx="5824728" cy="5882640"/>
-            </a:xfrm>
-            <a:prstGeom prst="rect">
-              <a:avLst/>
-            </a:prstGeom>
-          </p:spPr>
-        </p:pic>
-        <p:pic>
-          <p:nvPicPr>
-            <p:cNvPr id="5" name="object 5"/>
-            <p:cNvPicPr/>
-            <p:nvPr/>
-          </p:nvPicPr>
-          <p:blipFill>
-            <a:blip r:embed="rId2" cstate="print"/>
-            <a:stretch>
-              <a:fillRect/>
-            </a:stretch>
-          </p:blipFill>
-          <p:spPr>
-            <a:xfrm>
-              <a:off x="1557122" y="1004257"/>
-              <a:ext cx="5643820" cy="5703072"/>
-            </a:xfrm>
-            <a:prstGeom prst="rect">
-              <a:avLst/>
-            </a:prstGeom>
-          </p:spPr>
-        </p:pic>
-        <p:sp>
-          <p:nvSpPr>
-            <p:cNvPr id="6" name="object 6"/>
-            <p:cNvSpPr/>
-            <p:nvPr/>
-          </p:nvSpPr>
-          <p:spPr>
-            <a:xfrm>
-              <a:off x="1538072" y="985207"/>
-              <a:ext cx="5681980" cy="5741670"/>
-            </a:xfrm>
-            <a:custGeom>
-              <a:avLst/>
-              <a:gdLst/>
-              <a:ahLst/>
-              <a:cxnLst/>
-              <a:rect l="l" t="t" r="r" b="b"/>
-              <a:pathLst>
-                <a:path w="5681980" h="5741670">
-                  <a:moveTo>
-                    <a:pt x="0" y="0"/>
-                  </a:moveTo>
-                  <a:lnTo>
-                    <a:pt x="5681919" y="0"/>
-                  </a:lnTo>
-                  <a:lnTo>
-                    <a:pt x="5681919" y="5741172"/>
-                  </a:lnTo>
-                  <a:lnTo>
-                    <a:pt x="0" y="5741172"/>
-                  </a:lnTo>
-                  <a:lnTo>
-                    <a:pt x="0" y="0"/>
-                  </a:lnTo>
-                  <a:close/>
-                </a:path>
-              </a:pathLst>
-            </a:custGeom>
-            <a:ln w="38100">
-              <a:solidFill>
-                <a:srgbClr val="000000"/>
-              </a:solidFill>
-            </a:ln>
-          </p:spPr>
-          <p:txBody>
-            <a:bodyPr wrap="square" lIns="0" tIns="0" rIns="0" bIns="0" rtlCol="0"/>
-            <a:lstStyle/>
-            <a:p/>
-          </p:txBody>
-        </p:sp>
-      </p:grpSp>
       <p:sp>
         <p:nvSpPr>
           <p:cNvPr id="7" name="object 7"/>
@@ -3773,6 +3664,24 @@
       </p:sp>
       <p:sp>
         <p:nvSpPr>
+          <p:cNvPr id="14" name="Content Placeholder 13"/>
+          <p:cNvSpPr>
+            <a:spLocks noGrp="1"/>
+          </p:cNvSpPr>
+          <p:nvPr>
+            <p:ph sz="half" idx="3"/>
+          </p:nvPr>
+        </p:nvSpPr>
+        <p:spPr/>
+        <p:txBody>
+          <a:bodyPr/>
+          <a:p>
+            <a:endParaRPr lang="en-US"/>
+          </a:p>
+        </p:txBody>
+      </p:sp>
+      <p:sp>
+        <p:nvSpPr>
           <p:cNvPr id="8" name="object 8"/>
           <p:cNvSpPr/>
           <p:nvPr/>
@@ -4107,6 +4016,57 @@
           </a:p>
         </p:txBody>
       </p:sp>
+      <p:graphicFrame>
+        <p:nvGraphicFramePr>
+          <p:cNvPr id="12" name="Content Placeholder 11"/>
+          <p:cNvGraphicFramePr/>
+          <p:nvPr>
+            <p:ph sz="half" idx="2"/>
+          </p:nvPr>
+        </p:nvGraphicFramePr>
+        <p:xfrm>
+          <a:off x="1503045" y="838200"/>
+          <a:ext cx="5939155" cy="5704205"/>
+        </p:xfrm>
+        <a:graphic>
+          <a:graphicData uri="http://schemas.openxmlformats.org/presentationml/2006/ole">
+            <mc:AlternateContent xmlns:mc="http://schemas.openxmlformats.org/markup-compatibility/2006">
+              <mc:Choice xmlns:v="urn:schemas-microsoft-com:vml" Requires="v">
+                <p:oleObj spid="_x0000_s13" name="" r:id="rId1" imgW="5829300" imgH="5886450" progId="Paint.Picture">
+                  <p:embed/>
+                </p:oleObj>
+              </mc:Choice>
+              <mc:Fallback>
+                <p:oleObj name="" r:id="rId1" imgW="5829300" imgH="5886450" progId="Paint.Picture">
+                  <p:embed/>
+                  <p:pic>
+                    <p:nvPicPr>
+                      <p:cNvPr id="0" name="Picture 12"/>
+                      <p:cNvPicPr/>
+                      <p:nvPr/>
+                    </p:nvPicPr>
+                    <p:blipFill>
+                      <a:blip r:embed="rId2"/>
+                      <a:stretch>
+                        <a:fillRect/>
+                      </a:stretch>
+                    </p:blipFill>
+                    <p:spPr>
+                      <a:xfrm>
+                        <a:off x="1503045" y="838200"/>
+                        <a:ext cx="5939155" cy="5704205"/>
+                      </a:xfrm>
+                      <a:prstGeom prst="rect">
+                        <a:avLst/>
+                      </a:prstGeom>
+                    </p:spPr>
+                  </p:pic>
+                </p:oleObj>
+              </mc:Fallback>
+            </mc:AlternateContent>
+          </a:graphicData>
+        </a:graphic>
+      </p:graphicFrame>
     </p:spTree>
   </p:cSld>
   <p:clrMapOvr>

</xml_diff>